<commit_message>
add memory_layout write up
</commit_message>
<xml_diff>
--- a/php-internal.pptx
+++ b/php-internal.pptx
@@ -1,24 +1,24 @@
 
 <file path=ppt/presentation.xml><?xml version="1.0" encoding="utf-8"?>
-<p:presentation xmlns:a="http://schemas.openxmlformats.org/drawingml/2006/main" xmlns:r="http://schemas.openxmlformats.org/officeDocument/2006/relationships" xmlns:p="http://schemas.openxmlformats.org/presentationml/2006/main" saveSubsetFonts="1" autoCompressPictures="0">
+<p:presentation xmlns:a="http://schemas.openxmlformats.org/drawingml/2006/main" xmlns:r="http://schemas.openxmlformats.org/officeDocument/2006/relationships" xmlns:p="http://schemas.openxmlformats.org/presentationml/2006/main" autoCompressPictures="0">
   <p:sldMasterIdLst>
     <p:sldMasterId id="2147483648" r:id="rId1"/>
   </p:sldMasterIdLst>
   <p:sldIdLst>
-    <p:sldId id="256" r:id="rId2"/>
-    <p:sldId id="257" r:id="rId3"/>
-    <p:sldId id="258" r:id="rId4"/>
-    <p:sldId id="259" r:id="rId5"/>
-    <p:sldId id="260" r:id="rId6"/>
-    <p:sldId id="262" r:id="rId7"/>
-    <p:sldId id="261" r:id="rId8"/>
-    <p:sldId id="263" r:id="rId9"/>
-    <p:sldId id="269" r:id="rId10"/>
-    <p:sldId id="264" r:id="rId11"/>
-    <p:sldId id="266" r:id="rId12"/>
-    <p:sldId id="267" r:id="rId13"/>
-    <p:sldId id="268" r:id="rId14"/>
-    <p:sldId id="265" r:id="rId15"/>
+    <p:sldId id="256" r:id="rId3"/>
+    <p:sldId id="257" r:id="rId4"/>
+    <p:sldId id="258" r:id="rId5"/>
+    <p:sldId id="259" r:id="rId6"/>
+    <p:sldId id="260" r:id="rId7"/>
+    <p:sldId id="262" r:id="rId8"/>
+    <p:sldId id="261" r:id="rId9"/>
+    <p:sldId id="263" r:id="rId10"/>
+    <p:sldId id="269" r:id="rId11"/>
+    <p:sldId id="264" r:id="rId12"/>
+    <p:sldId id="266" r:id="rId13"/>
+    <p:sldId id="267" r:id="rId14"/>
+    <p:sldId id="268" r:id="rId15"/>
+    <p:sldId id="265" r:id="rId16"/>
   </p:sldIdLst>
   <p:sldSz cx="12192000" cy="6858000"/>
   <p:notesSz cx="6858000" cy="9144000"/>
@@ -117,11 +117,6 @@
       </a:defRPr>
     </a:lvl9pPr>
   </p:defaultTextStyle>
-  <p:extLst>
-    <p:ext uri="{EFAFB233-063F-42B5-8137-9DF3F51BA10A}">
-      <p15:sldGuideLst xmlns:p15="http://schemas.microsoft.com/office/powerpoint/2012/main"/>
-    </p:ext>
-  </p:extLst>
 </p:presentation>
 </file>
 
@@ -264,7 +259,6 @@
           <a:p>
             <a:fld id="{48A87A34-81AB-432B-8DAE-1953F412C126}" type="datetimeFigureOut">
               <a:rPr lang="en-US" dirty="0"/>
-              <a:t>4/10/19</a:t>
             </a:fld>
             <a:endParaRPr lang="en-US" dirty="0"/>
           </a:p>
@@ -316,7 +310,6 @@
           <a:p>
             <a:fld id="{6D22F896-40B5-4ADD-8801-0D06FADFA095}" type="slidenum">
               <a:rPr lang="en-US" dirty="0"/>
-              <a:t>‹#›</a:t>
             </a:fld>
             <a:endParaRPr lang="en-US" dirty="0"/>
           </a:p>
@@ -421,6 +414,7 @@
               <a:rPr lang="zh-CN" altLang="en-US" smtClean="0"/>
               <a:t>单击此处编辑母版文本样式</a:t>
             </a:r>
+            <a:endParaRPr lang="zh-CN" altLang="en-US" smtClean="0"/>
           </a:p>
           <a:p>
             <a:pPr lvl="1"/>
@@ -428,6 +422,7 @@
               <a:rPr lang="zh-CN" altLang="en-US" smtClean="0"/>
               <a:t>二级</a:t>
             </a:r>
+            <a:endParaRPr lang="zh-CN" altLang="en-US" smtClean="0"/>
           </a:p>
           <a:p>
             <a:pPr lvl="2"/>
@@ -435,6 +430,7 @@
               <a:rPr lang="zh-CN" altLang="en-US" smtClean="0"/>
               <a:t>三级</a:t>
             </a:r>
+            <a:endParaRPr lang="zh-CN" altLang="en-US" smtClean="0"/>
           </a:p>
           <a:p>
             <a:pPr lvl="3"/>
@@ -442,6 +438,7 @@
               <a:rPr lang="zh-CN" altLang="en-US" smtClean="0"/>
               <a:t>四级</a:t>
             </a:r>
+            <a:endParaRPr lang="zh-CN" altLang="en-US" smtClean="0"/>
           </a:p>
           <a:p>
             <a:pPr lvl="4"/>
@@ -470,7 +467,6 @@
           <a:p>
             <a:fld id="{48A87A34-81AB-432B-8DAE-1953F412C126}" type="datetimeFigureOut">
               <a:rPr lang="en-US" dirty="0"/>
-              <a:t>4/10/19</a:t>
             </a:fld>
             <a:endParaRPr lang="en-US" dirty="0"/>
           </a:p>
@@ -512,7 +508,6 @@
           <a:p>
             <a:fld id="{6D22F896-40B5-4ADD-8801-0D06FADFA095}" type="slidenum">
               <a:rPr lang="en-US" dirty="0"/>
-              <a:t>‹#›</a:t>
             </a:fld>
             <a:endParaRPr lang="en-US" dirty="0"/>
           </a:p>
@@ -631,6 +626,7 @@
               <a:rPr lang="zh-CN" altLang="en-US" smtClean="0"/>
               <a:t>单击此处编辑母版文本样式</a:t>
             </a:r>
+            <a:endParaRPr lang="zh-CN" altLang="en-US" smtClean="0"/>
           </a:p>
           <a:p>
             <a:pPr lvl="1"/>
@@ -638,6 +634,7 @@
               <a:rPr lang="zh-CN" altLang="en-US" smtClean="0"/>
               <a:t>二级</a:t>
             </a:r>
+            <a:endParaRPr lang="zh-CN" altLang="en-US" smtClean="0"/>
           </a:p>
           <a:p>
             <a:pPr lvl="2"/>
@@ -645,6 +642,7 @@
               <a:rPr lang="zh-CN" altLang="en-US" smtClean="0"/>
               <a:t>三级</a:t>
             </a:r>
+            <a:endParaRPr lang="zh-CN" altLang="en-US" smtClean="0"/>
           </a:p>
           <a:p>
             <a:pPr lvl="3"/>
@@ -652,6 +650,7 @@
               <a:rPr lang="zh-CN" altLang="en-US" smtClean="0"/>
               <a:t>四级</a:t>
             </a:r>
+            <a:endParaRPr lang="zh-CN" altLang="en-US" smtClean="0"/>
           </a:p>
           <a:p>
             <a:pPr lvl="4"/>
@@ -680,7 +679,6 @@
           <a:p>
             <a:fld id="{48A87A34-81AB-432B-8DAE-1953F412C126}" type="datetimeFigureOut">
               <a:rPr lang="en-US" dirty="0"/>
-              <a:t>4/10/19</a:t>
             </a:fld>
             <a:endParaRPr lang="en-US" dirty="0"/>
           </a:p>
@@ -722,7 +720,6 @@
           <a:p>
             <a:fld id="{6D22F896-40B5-4ADD-8801-0D06FADFA095}" type="slidenum">
               <a:rPr lang="en-US" dirty="0"/>
-              <a:t>‹#›</a:t>
             </a:fld>
             <a:endParaRPr lang="en-US" dirty="0"/>
           </a:p>
@@ -827,6 +824,7 @@
               <a:rPr lang="zh-CN" altLang="en-US" smtClean="0"/>
               <a:t>单击此处编辑母版文本样式</a:t>
             </a:r>
+            <a:endParaRPr lang="zh-CN" altLang="en-US" smtClean="0"/>
           </a:p>
           <a:p>
             <a:pPr lvl="1"/>
@@ -834,6 +832,7 @@
               <a:rPr lang="zh-CN" altLang="en-US" smtClean="0"/>
               <a:t>二级</a:t>
             </a:r>
+            <a:endParaRPr lang="zh-CN" altLang="en-US" smtClean="0"/>
           </a:p>
           <a:p>
             <a:pPr lvl="2"/>
@@ -841,6 +840,7 @@
               <a:rPr lang="zh-CN" altLang="en-US" smtClean="0"/>
               <a:t>三级</a:t>
             </a:r>
+            <a:endParaRPr lang="zh-CN" altLang="en-US" smtClean="0"/>
           </a:p>
           <a:p>
             <a:pPr lvl="3"/>
@@ -848,6 +848,7 @@
               <a:rPr lang="zh-CN" altLang="en-US" smtClean="0"/>
               <a:t>四级</a:t>
             </a:r>
+            <a:endParaRPr lang="zh-CN" altLang="en-US" smtClean="0"/>
           </a:p>
           <a:p>
             <a:pPr lvl="4"/>
@@ -876,7 +877,6 @@
           <a:p>
             <a:fld id="{48A87A34-81AB-432B-8DAE-1953F412C126}" type="datetimeFigureOut">
               <a:rPr lang="en-US" dirty="0"/>
-              <a:t>4/10/19</a:t>
             </a:fld>
             <a:endParaRPr lang="en-US" dirty="0"/>
           </a:p>
@@ -918,7 +918,6 @@
           <a:p>
             <a:fld id="{6D22F896-40B5-4ADD-8801-0D06FADFA095}" type="slidenum">
               <a:rPr lang="en-US" dirty="0"/>
-              <a:t>‹#›</a:t>
             </a:fld>
             <a:endParaRPr lang="en-US" dirty="0"/>
           </a:p>
@@ -1130,6 +1129,7 @@
               <a:rPr lang="zh-CN" altLang="en-US" smtClean="0"/>
               <a:t>单击此处编辑母版文本样式</a:t>
             </a:r>
+            <a:endParaRPr lang="zh-CN" altLang="en-US" smtClean="0"/>
           </a:p>
         </p:txBody>
       </p:sp>
@@ -1150,7 +1150,6 @@
           <a:p>
             <a:fld id="{48A87A34-81AB-432B-8DAE-1953F412C126}" type="datetimeFigureOut">
               <a:rPr lang="en-US" dirty="0"/>
-              <a:t>4/10/19</a:t>
             </a:fld>
             <a:endParaRPr lang="en-US" dirty="0"/>
           </a:p>
@@ -1192,7 +1191,6 @@
           <a:p>
             <a:fld id="{6D22F896-40B5-4ADD-8801-0D06FADFA095}" type="slidenum">
               <a:rPr lang="en-US" dirty="0"/>
-              <a:t>‹#›</a:t>
             </a:fld>
             <a:endParaRPr lang="en-US" dirty="0"/>
           </a:p>
@@ -1307,6 +1305,7 @@
               <a:rPr lang="zh-CN" altLang="en-US" smtClean="0"/>
               <a:t>单击此处编辑母版文本样式</a:t>
             </a:r>
+            <a:endParaRPr lang="zh-CN" altLang="en-US" smtClean="0"/>
           </a:p>
           <a:p>
             <a:pPr lvl="1"/>
@@ -1314,6 +1313,7 @@
               <a:rPr lang="zh-CN" altLang="en-US" smtClean="0"/>
               <a:t>二级</a:t>
             </a:r>
+            <a:endParaRPr lang="zh-CN" altLang="en-US" smtClean="0"/>
           </a:p>
           <a:p>
             <a:pPr lvl="2"/>
@@ -1321,6 +1321,7 @@
               <a:rPr lang="zh-CN" altLang="en-US" smtClean="0"/>
               <a:t>三级</a:t>
             </a:r>
+            <a:endParaRPr lang="zh-CN" altLang="en-US" smtClean="0"/>
           </a:p>
           <a:p>
             <a:pPr lvl="3"/>
@@ -1328,6 +1329,7 @@
               <a:rPr lang="zh-CN" altLang="en-US" smtClean="0"/>
               <a:t>四级</a:t>
             </a:r>
+            <a:endParaRPr lang="zh-CN" altLang="en-US" smtClean="0"/>
           </a:p>
           <a:p>
             <a:pPr lvl="4"/>
@@ -1364,6 +1366,7 @@
               <a:rPr lang="zh-CN" altLang="en-US" smtClean="0"/>
               <a:t>单击此处编辑母版文本样式</a:t>
             </a:r>
+            <a:endParaRPr lang="zh-CN" altLang="en-US" smtClean="0"/>
           </a:p>
           <a:p>
             <a:pPr lvl="1"/>
@@ -1371,6 +1374,7 @@
               <a:rPr lang="zh-CN" altLang="en-US" smtClean="0"/>
               <a:t>二级</a:t>
             </a:r>
+            <a:endParaRPr lang="zh-CN" altLang="en-US" smtClean="0"/>
           </a:p>
           <a:p>
             <a:pPr lvl="2"/>
@@ -1378,6 +1382,7 @@
               <a:rPr lang="zh-CN" altLang="en-US" smtClean="0"/>
               <a:t>三级</a:t>
             </a:r>
+            <a:endParaRPr lang="zh-CN" altLang="en-US" smtClean="0"/>
           </a:p>
           <a:p>
             <a:pPr lvl="3"/>
@@ -1385,6 +1390,7 @@
               <a:rPr lang="zh-CN" altLang="en-US" smtClean="0"/>
               <a:t>四级</a:t>
             </a:r>
+            <a:endParaRPr lang="zh-CN" altLang="en-US" smtClean="0"/>
           </a:p>
           <a:p>
             <a:pPr lvl="4"/>
@@ -1413,7 +1419,6 @@
           <a:p>
             <a:fld id="{48A87A34-81AB-432B-8DAE-1953F412C126}" type="datetimeFigureOut">
               <a:rPr lang="en-US" dirty="0"/>
-              <a:t>4/10/19</a:t>
             </a:fld>
             <a:endParaRPr lang="en-US" dirty="0"/>
           </a:p>
@@ -1455,7 +1460,6 @@
           <a:p>
             <a:fld id="{6D22F896-40B5-4ADD-8801-0D06FADFA095}" type="slidenum">
               <a:rPr lang="en-US" dirty="0"/>
-              <a:t>‹#›</a:t>
             </a:fld>
             <a:endParaRPr lang="en-US" dirty="0"/>
           </a:p>
@@ -1616,6 +1620,7 @@
               <a:rPr lang="zh-CN" altLang="en-US" smtClean="0"/>
               <a:t>单击此处编辑母版文本样式</a:t>
             </a:r>
+            <a:endParaRPr lang="zh-CN" altLang="en-US" smtClean="0"/>
           </a:p>
         </p:txBody>
       </p:sp>
@@ -1644,6 +1649,7 @@
               <a:rPr lang="zh-CN" altLang="en-US" smtClean="0"/>
               <a:t>单击此处编辑母版文本样式</a:t>
             </a:r>
+            <a:endParaRPr lang="zh-CN" altLang="en-US" smtClean="0"/>
           </a:p>
           <a:p>
             <a:pPr lvl="1"/>
@@ -1651,6 +1657,7 @@
               <a:rPr lang="zh-CN" altLang="en-US" smtClean="0"/>
               <a:t>二级</a:t>
             </a:r>
+            <a:endParaRPr lang="zh-CN" altLang="en-US" smtClean="0"/>
           </a:p>
           <a:p>
             <a:pPr lvl="2"/>
@@ -1658,6 +1665,7 @@
               <a:rPr lang="zh-CN" altLang="en-US" smtClean="0"/>
               <a:t>三级</a:t>
             </a:r>
+            <a:endParaRPr lang="zh-CN" altLang="en-US" smtClean="0"/>
           </a:p>
           <a:p>
             <a:pPr lvl="3"/>
@@ -1665,6 +1673,7 @@
               <a:rPr lang="zh-CN" altLang="en-US" smtClean="0"/>
               <a:t>四级</a:t>
             </a:r>
+            <a:endParaRPr lang="zh-CN" altLang="en-US" smtClean="0"/>
           </a:p>
           <a:p>
             <a:pPr lvl="4"/>
@@ -1747,6 +1756,7 @@
               <a:rPr lang="zh-CN" altLang="en-US" smtClean="0"/>
               <a:t>单击此处编辑母版文本样式</a:t>
             </a:r>
+            <a:endParaRPr lang="zh-CN" altLang="en-US" smtClean="0"/>
           </a:p>
         </p:txBody>
       </p:sp>
@@ -1775,6 +1785,7 @@
               <a:rPr lang="zh-CN" altLang="en-US" smtClean="0"/>
               <a:t>单击此处编辑母版文本样式</a:t>
             </a:r>
+            <a:endParaRPr lang="zh-CN" altLang="en-US" smtClean="0"/>
           </a:p>
           <a:p>
             <a:pPr lvl="1"/>
@@ -1782,6 +1793,7 @@
               <a:rPr lang="zh-CN" altLang="en-US" smtClean="0"/>
               <a:t>二级</a:t>
             </a:r>
+            <a:endParaRPr lang="zh-CN" altLang="en-US" smtClean="0"/>
           </a:p>
           <a:p>
             <a:pPr lvl="2"/>
@@ -1789,6 +1801,7 @@
               <a:rPr lang="zh-CN" altLang="en-US" smtClean="0"/>
               <a:t>三级</a:t>
             </a:r>
+            <a:endParaRPr lang="zh-CN" altLang="en-US" smtClean="0"/>
           </a:p>
           <a:p>
             <a:pPr lvl="3"/>
@@ -1796,6 +1809,7 @@
               <a:rPr lang="zh-CN" altLang="en-US" smtClean="0"/>
               <a:t>四级</a:t>
             </a:r>
+            <a:endParaRPr lang="zh-CN" altLang="en-US" smtClean="0"/>
           </a:p>
           <a:p>
             <a:pPr lvl="4"/>
@@ -1824,7 +1838,6 @@
           <a:p>
             <a:fld id="{48A87A34-81AB-432B-8DAE-1953F412C126}" type="datetimeFigureOut">
               <a:rPr lang="en-US" dirty="0"/>
-              <a:t>4/10/19</a:t>
             </a:fld>
             <a:endParaRPr lang="en-US" dirty="0"/>
           </a:p>
@@ -1866,7 +1879,6 @@
           <a:p>
             <a:fld id="{6D22F896-40B5-4ADD-8801-0D06FADFA095}" type="slidenum">
               <a:rPr lang="en-US" dirty="0"/>
-              <a:t>‹#›</a:t>
             </a:fld>
             <a:endParaRPr lang="en-US" dirty="0"/>
           </a:p>
@@ -1968,7 +1980,6 @@
           <a:p>
             <a:fld id="{48A87A34-81AB-432B-8DAE-1953F412C126}" type="datetimeFigureOut">
               <a:rPr lang="en-US" dirty="0"/>
-              <a:t>4/10/19</a:t>
             </a:fld>
             <a:endParaRPr lang="en-US" dirty="0"/>
           </a:p>
@@ -2010,7 +2021,6 @@
           <a:p>
             <a:fld id="{6D22F896-40B5-4ADD-8801-0D06FADFA095}" type="slidenum">
               <a:rPr lang="en-US" dirty="0"/>
-              <a:t>‹#›</a:t>
             </a:fld>
             <a:endParaRPr lang="en-US" dirty="0"/>
           </a:p>
@@ -2089,7 +2099,6 @@
           <a:p>
             <a:fld id="{48A87A34-81AB-432B-8DAE-1953F412C126}" type="datetimeFigureOut">
               <a:rPr lang="en-US" dirty="0"/>
-              <a:t>4/10/19</a:t>
             </a:fld>
             <a:endParaRPr lang="en-US" dirty="0"/>
           </a:p>
@@ -2131,7 +2140,6 @@
           <a:p>
             <a:fld id="{6D22F896-40B5-4ADD-8801-0D06FADFA095}" type="slidenum">
               <a:rPr lang="en-US" dirty="0"/>
-              <a:t>‹#›</a:t>
             </a:fld>
             <a:endParaRPr lang="en-US" dirty="0"/>
           </a:p>
@@ -2221,6 +2229,7 @@
               <a:rPr lang="zh-CN" altLang="en-US" smtClean="0"/>
               <a:t>单击此处编辑母版文本样式</a:t>
             </a:r>
+            <a:endParaRPr lang="zh-CN" altLang="en-US" smtClean="0"/>
           </a:p>
           <a:p>
             <a:pPr lvl="1"/>
@@ -2228,6 +2237,7 @@
               <a:rPr lang="zh-CN" altLang="en-US" smtClean="0"/>
               <a:t>二级</a:t>
             </a:r>
+            <a:endParaRPr lang="zh-CN" altLang="en-US" smtClean="0"/>
           </a:p>
           <a:p>
             <a:pPr lvl="2"/>
@@ -2235,6 +2245,7 @@
               <a:rPr lang="zh-CN" altLang="en-US" smtClean="0"/>
               <a:t>三级</a:t>
             </a:r>
+            <a:endParaRPr lang="zh-CN" altLang="en-US" smtClean="0"/>
           </a:p>
           <a:p>
             <a:pPr lvl="3"/>
@@ -2242,6 +2253,7 @@
               <a:rPr lang="zh-CN" altLang="en-US" smtClean="0"/>
               <a:t>四级</a:t>
             </a:r>
+            <a:endParaRPr lang="zh-CN" altLang="en-US" smtClean="0"/>
           </a:p>
           <a:p>
             <a:pPr lvl="4"/>
@@ -2315,6 +2327,7 @@
               <a:rPr lang="zh-CN" altLang="en-US" smtClean="0"/>
               <a:t>单击此处编辑母版文本样式</a:t>
             </a:r>
+            <a:endParaRPr lang="zh-CN" altLang="en-US" smtClean="0"/>
           </a:p>
         </p:txBody>
       </p:sp>
@@ -2335,7 +2348,6 @@
           <a:p>
             <a:fld id="{48A87A34-81AB-432B-8DAE-1953F412C126}" type="datetimeFigureOut">
               <a:rPr lang="en-US" dirty="0"/>
-              <a:t>4/10/19</a:t>
             </a:fld>
             <a:endParaRPr lang="en-US" dirty="0"/>
           </a:p>
@@ -2377,7 +2389,6 @@
           <a:p>
             <a:fld id="{6D22F896-40B5-4ADD-8801-0D06FADFA095}" type="slidenum">
               <a:rPr lang="en-US" dirty="0"/>
-              <a:t>‹#›</a:t>
             </a:fld>
             <a:endParaRPr lang="en-US" dirty="0"/>
           </a:p>
@@ -2614,7 +2625,7 @@
             <a:spLocks noGrp="1" noChangeAspect="1"/>
           </p:cNvSpPr>
           <p:nvPr>
-            <p:ph type="pic" idx="1"/>
+            <p:ph type="pic" idx="1" hasCustomPrompt="1"/>
           </p:nvPr>
         </p:nvSpPr>
         <p:spPr>
@@ -2746,6 +2757,7 @@
               <a:rPr lang="zh-CN" altLang="en-US" smtClean="0"/>
               <a:t>单击此处编辑母版文本样式</a:t>
             </a:r>
+            <a:endParaRPr lang="zh-CN" altLang="en-US" smtClean="0"/>
           </a:p>
         </p:txBody>
       </p:sp>
@@ -2775,8 +2787,6 @@
           <a:p>
             <a:fld id="{48A87A34-81AB-432B-8DAE-1953F412C126}" type="datetimeFigureOut">
               <a:rPr lang="en-US" dirty="0"/>
-              <a:pPr/>
-              <a:t>4/10/19</a:t>
             </a:fld>
             <a:endParaRPr lang="en-US" dirty="0"/>
           </a:p>
@@ -2823,7 +2833,6 @@
           <a:p>
             <a:fld id="{6D22F896-40B5-4ADD-8801-0D06FADFA095}" type="slidenum">
               <a:rPr lang="en-US" dirty="0"/>
-              <a:t>‹#›</a:t>
             </a:fld>
             <a:endParaRPr lang="en-US" dirty="0"/>
           </a:p>
@@ -2948,7 +2957,7 @@
           <p:nvPr/>
         </p:nvPicPr>
         <p:blipFill rotWithShape="1">
-          <a:blip r:embed="rId13">
+          <a:blip r:embed="rId12">
             <a:extLst>
               <a:ext uri="{28A0092B-C50C-407E-A947-70E740481C1C}">
                 <a14:useLocalDpi xmlns:a14="http://schemas.microsoft.com/office/drawing/2010/main" val="0"/>
@@ -2956,7 +2965,9 @@
             </a:extLst>
           </a:blip>
           <a:srcRect t="1538" b="-1538"/>
-          <a:stretch/>
+          <a:stretch>
+            <a:fillRect/>
+          </a:stretch>
         </p:blipFill>
         <p:spPr bwMode="black">
           <a:xfrm>
@@ -3031,6 +3042,7 @@
               <a:rPr lang="en-US" dirty="0"/>
               <a:t>Edit Master text styles</a:t>
             </a:r>
+            <a:endParaRPr lang="en-US" dirty="0"/>
           </a:p>
           <a:p>
             <a:pPr lvl="1"/>
@@ -3038,6 +3050,7 @@
               <a:rPr lang="en-US" dirty="0"/>
               <a:t>Second level</a:t>
             </a:r>
+            <a:endParaRPr lang="en-US" dirty="0"/>
           </a:p>
           <a:p>
             <a:pPr lvl="2"/>
@@ -3045,6 +3058,7 @@
               <a:rPr lang="en-US" dirty="0"/>
               <a:t>Third level</a:t>
             </a:r>
+            <a:endParaRPr lang="en-US" dirty="0"/>
           </a:p>
           <a:p>
             <a:pPr lvl="3"/>
@@ -3052,6 +3066,7 @@
               <a:rPr lang="en-US" dirty="0"/>
               <a:t>Fourth level</a:t>
             </a:r>
+            <a:endParaRPr lang="en-US" dirty="0"/>
           </a:p>
           <a:p>
             <a:pPr lvl="4"/>
@@ -3059,6 +3074,7 @@
               <a:rPr lang="en-US" dirty="0"/>
               <a:t>Fifth level</a:t>
             </a:r>
+            <a:endParaRPr lang="en-US" dirty="0"/>
           </a:p>
         </p:txBody>
       </p:sp>
@@ -3097,8 +3113,6 @@
           <a:p>
             <a:fld id="{48A87A34-81AB-432B-8DAE-1953F412C126}" type="datetimeFigureOut">
               <a:rPr lang="en-US" dirty="0"/>
-              <a:pPr/>
-              <a:t>4/10/19</a:t>
             </a:fld>
             <a:endParaRPr lang="en-US" dirty="0"/>
           </a:p>
@@ -3174,8 +3188,6 @@
           <a:p>
             <a:fld id="{6D22F896-40B5-4ADD-8801-0D06FADFA095}" type="slidenum">
               <a:rPr lang="en-US" dirty="0"/>
-              <a:pPr/>
-              <a:t>‹#›</a:t>
             </a:fld>
             <a:endParaRPr lang="en-US" dirty="0"/>
           </a:p>
@@ -3267,7 +3279,7 @@
           <a:schemeClr val="accent1"/>
         </a:buClr>
         <a:buSzPct val="100000"/>
-        <a:buFont typeface="Arial" panose="020B0604020202020204" pitchFamily="34" charset="0"/>
+        <a:buFont typeface="Arial" panose="020B0604020202090204" pitchFamily="34" charset="0"/>
         <a:buChar char="•"/>
         <a:defRPr sz="2000" kern="1200">
           <a:solidFill>
@@ -3290,7 +3302,7 @@
           <a:schemeClr val="accent1"/>
         </a:buClr>
         <a:buSzPct val="100000"/>
-        <a:buFont typeface="Arial" panose="020B0604020202020204" pitchFamily="34" charset="0"/>
+        <a:buFont typeface="Arial" panose="020B0604020202090204" pitchFamily="34" charset="0"/>
         <a:buChar char="•"/>
         <a:defRPr sz="1800" kern="1200" cap="none" baseline="0">
           <a:solidFill>
@@ -3313,7 +3325,7 @@
           <a:schemeClr val="accent1"/>
         </a:buClr>
         <a:buSzPct val="100000"/>
-        <a:buFont typeface="Arial" panose="020B0604020202020204" pitchFamily="34" charset="0"/>
+        <a:buFont typeface="Arial" panose="020B0604020202090204" pitchFamily="34" charset="0"/>
         <a:buChar char="•"/>
         <a:defRPr sz="1600" kern="1200">
           <a:solidFill>
@@ -3336,7 +3348,7 @@
           <a:schemeClr val="accent1"/>
         </a:buClr>
         <a:buSzPct val="100000"/>
-        <a:buFont typeface="Arial" panose="020B0604020202020204" pitchFamily="34" charset="0"/>
+        <a:buFont typeface="Arial" panose="020B0604020202090204" pitchFamily="34" charset="0"/>
         <a:buChar char="•"/>
         <a:defRPr sz="1400" kern="1200" cap="none" baseline="0">
           <a:solidFill>
@@ -3359,7 +3371,7 @@
           <a:schemeClr val="accent1"/>
         </a:buClr>
         <a:buSzPct val="100000"/>
-        <a:buFont typeface="Arial" panose="020B0604020202020204" pitchFamily="34" charset="0"/>
+        <a:buFont typeface="Arial" panose="020B0604020202090204" pitchFamily="34" charset="0"/>
         <a:buChar char="•"/>
         <a:defRPr sz="1200" kern="1200">
           <a:solidFill>
@@ -3382,7 +3394,7 @@
           <a:schemeClr val="accent1"/>
         </a:buClr>
         <a:buSzPct val="100000"/>
-        <a:buFont typeface="Arial" panose="020B0604020202020204" pitchFamily="34" charset="0"/>
+        <a:buFont typeface="Arial" panose="020B0604020202090204" pitchFamily="34" charset="0"/>
         <a:buChar char="•"/>
         <a:defRPr sz="1200" kern="1200">
           <a:solidFill>
@@ -3405,7 +3417,7 @@
           <a:schemeClr val="accent1"/>
         </a:buClr>
         <a:buSzPct val="100000"/>
-        <a:buFont typeface="Arial" panose="020B0604020202020204" pitchFamily="34" charset="0"/>
+        <a:buFont typeface="Arial" panose="020B0604020202090204" pitchFamily="34" charset="0"/>
         <a:buChar char="•"/>
         <a:defRPr sz="1200" kern="1200">
           <a:solidFill>
@@ -3428,7 +3440,7 @@
           <a:schemeClr val="accent1"/>
         </a:buClr>
         <a:buSzPct val="100000"/>
-        <a:buFont typeface="Arial" panose="020B0604020202020204" pitchFamily="34" charset="0"/>
+        <a:buFont typeface="Arial" panose="020B0604020202090204" pitchFamily="34" charset="0"/>
         <a:buChar char="•"/>
         <a:defRPr sz="1200" kern="1200" baseline="0">
           <a:solidFill>
@@ -3451,7 +3463,7 @@
           <a:schemeClr val="accent1"/>
         </a:buClr>
         <a:buSzPct val="100000"/>
-        <a:buFont typeface="Arial" panose="020B0604020202020204" pitchFamily="34" charset="0"/>
+        <a:buFont typeface="Arial" panose="020B0604020202090204" pitchFamily="34" charset="0"/>
         <a:buChar char="•"/>
         <a:defRPr sz="1200" kern="1200" baseline="0">
           <a:solidFill>
@@ -3674,11 +3686,6 @@
         </p:txBody>
       </p:sp>
     </p:spTree>
-    <p:extLst>
-      <p:ext uri="{BB962C8B-B14F-4D97-AF65-F5344CB8AC3E}">
-        <p14:creationId xmlns:p14="http://schemas.microsoft.com/office/powerpoint/2010/main" val="1524557679"/>
-      </p:ext>
-    </p:extLst>
   </p:cSld>
   <p:clrMapOvr>
     <a:masterClrMapping/>
@@ -3761,6 +3768,7 @@
               <a:rPr kumimoji="1" lang="en-US" altLang="zh-CN" dirty="0" smtClean="0"/>
               <a:t>compiler</a:t>
             </a:r>
+            <a:endParaRPr kumimoji="1" lang="en-US" altLang="zh-CN" dirty="0" smtClean="0"/>
           </a:p>
           <a:p>
             <a:r>
@@ -3775,6 +3783,7 @@
               <a:rPr kumimoji="1" lang="en-US" altLang="zh-CN" dirty="0" smtClean="0"/>
               <a:t>executor</a:t>
             </a:r>
+            <a:endParaRPr kumimoji="1" lang="en-US" altLang="zh-CN" dirty="0" smtClean="0"/>
           </a:p>
           <a:p>
             <a:r>
@@ -3794,11 +3803,6 @@
         </p:txBody>
       </p:sp>
     </p:spTree>
-    <p:extLst>
-      <p:ext uri="{BB962C8B-B14F-4D97-AF65-F5344CB8AC3E}">
-        <p14:creationId xmlns:p14="http://schemas.microsoft.com/office/powerpoint/2010/main" val="1422104858"/>
-      </p:ext>
-    </p:extLst>
   </p:cSld>
   <p:clrMapOvr>
     <a:masterClrMapping/>
@@ -3871,6 +3875,7 @@
               <a:rPr kumimoji="1" lang="en-US" altLang="zh-CN" dirty="0" smtClean="0"/>
               <a:t>(ISA)</a:t>
             </a:r>
+            <a:endParaRPr kumimoji="1" lang="en-US" altLang="zh-CN" dirty="0" smtClean="0"/>
           </a:p>
           <a:p>
             <a:pPr lvl="1"/>
@@ -3902,6 +3907,7 @@
               <a:rPr kumimoji="1" lang="en-US" altLang="zh-CN" dirty="0" smtClean="0"/>
               <a:t>)</a:t>
             </a:r>
+            <a:endParaRPr kumimoji="1" lang="en-US" altLang="zh-CN" dirty="0" smtClean="0"/>
           </a:p>
           <a:p>
             <a:pPr lvl="1"/>
@@ -3937,6 +3943,7 @@
               <a:rPr kumimoji="1" lang="en-US" altLang="zh-CN" dirty="0" smtClean="0"/>
               <a:t>)</a:t>
             </a:r>
+            <a:endParaRPr kumimoji="1" lang="en-US" altLang="zh-CN" dirty="0" smtClean="0"/>
           </a:p>
           <a:p>
             <a:r>
@@ -3955,6 +3962,7 @@
               <a:rPr lang="zh-CN" altLang="en-US" dirty="0"/>
               <a:t>语法实现</a:t>
             </a:r>
+            <a:endParaRPr lang="zh-CN" altLang="en-US" dirty="0"/>
           </a:p>
           <a:p>
             <a:pPr lvl="2"/>
@@ -3998,6 +4006,7 @@
               <a:rPr lang="zh-CN" altLang="en-US" dirty="0"/>
               <a:t>编译</a:t>
             </a:r>
+            <a:endParaRPr lang="zh-CN" altLang="en-US" dirty="0"/>
           </a:p>
           <a:p>
             <a:pPr lvl="2"/>
@@ -4021,6 +4030,7 @@
               <a:rPr lang="zh-CN" altLang="en-US" dirty="0"/>
               <a:t>执行引擎</a:t>
             </a:r>
+            <a:endParaRPr lang="zh-CN" altLang="en-US" dirty="0"/>
           </a:p>
           <a:p>
             <a:pPr lvl="2"/>
@@ -4040,6 +4050,7 @@
               <a:rPr lang="en-US" altLang="zh-CN" dirty="0"/>
               <a:t>_*</a:t>
             </a:r>
+            <a:endParaRPr lang="en-US" altLang="zh-CN" dirty="0"/>
           </a:p>
           <a:p>
             <a:pPr lvl="2"/>
@@ -4068,11 +4079,6 @@
         </p:txBody>
       </p:sp>
     </p:spTree>
-    <p:extLst>
-      <p:ext uri="{BB962C8B-B14F-4D97-AF65-F5344CB8AC3E}">
-        <p14:creationId xmlns:p14="http://schemas.microsoft.com/office/powerpoint/2010/main" val="145652455"/>
-      </p:ext>
-    </p:extLst>
   </p:cSld>
   <p:clrMapOvr>
     <a:masterClrMapping/>
@@ -4160,7 +4166,7 @@
           <p:nvPr/>
         </p:nvPicPr>
         <p:blipFill>
-          <a:blip r:embed="rId2">
+          <a:blip r:embed="rId1">
             <a:extLst>
               <a:ext uri="{28A0092B-C50C-407E-A947-70E740481C1C}">
                 <a14:useLocalDpi xmlns:a14="http://schemas.microsoft.com/office/drawing/2010/main" val="0"/>
@@ -4193,11 +4199,6 @@
         </p:spPr>
       </p:pic>
     </p:spTree>
-    <p:extLst>
-      <p:ext uri="{BB962C8B-B14F-4D97-AF65-F5344CB8AC3E}">
-        <p14:creationId xmlns:p14="http://schemas.microsoft.com/office/powerpoint/2010/main" val="856400873"/>
-      </p:ext>
-    </p:extLst>
   </p:cSld>
   <p:clrMapOvr>
     <a:masterClrMapping/>
@@ -4285,11 +4286,6 @@
         </p:txBody>
       </p:sp>
     </p:spTree>
-    <p:extLst>
-      <p:ext uri="{BB962C8B-B14F-4D97-AF65-F5344CB8AC3E}">
-        <p14:creationId xmlns:p14="http://schemas.microsoft.com/office/powerpoint/2010/main" val="235826344"/>
-      </p:ext>
-    </p:extLst>
   </p:cSld>
   <p:clrMapOvr>
     <a:masterClrMapping/>
@@ -4354,23 +4350,23 @@
           <a:p>
             <a:r>
               <a:rPr lang="en-US" altLang="zh-CN" dirty="0">
+                <a:hlinkClick r:id="rId1"/>
+              </a:rPr>
+              <a:t>https://</a:t>
+            </a:r>
+            <a:r>
+              <a:rPr lang="en-US" altLang="zh-CN" dirty="0" smtClean="0">
+                <a:hlinkClick r:id="rId1"/>
+              </a:rPr>
+              <a:t>nikic.github.io/2017/04/14/PHP-7-Virtual-machine.html</a:t>
+            </a:r>
+            <a:endParaRPr lang="en-US" altLang="zh-CN" dirty="0" smtClean="0"/>
+          </a:p>
+          <a:p>
+            <a:r>
+              <a:rPr lang="en-US" altLang="zh-CN" dirty="0">
                 <a:hlinkClick r:id="rId2"/>
               </a:rPr>
-              <a:t>https://</a:t>
-            </a:r>
-            <a:r>
-              <a:rPr lang="en-US" altLang="zh-CN" dirty="0" smtClean="0">
-                <a:hlinkClick r:id="rId2"/>
-              </a:rPr>
-              <a:t>nikic.github.io/2017/04/14/PHP-7-Virtual-machine.html</a:t>
-            </a:r>
-            <a:endParaRPr lang="en-US" altLang="zh-CN" dirty="0" smtClean="0"/>
-          </a:p>
-          <a:p>
-            <a:r>
-              <a:rPr lang="en-US" altLang="zh-CN" dirty="0">
-                <a:hlinkClick r:id="rId3"/>
-              </a:rPr>
               <a:t>https://phpinternals.net/categories/zend_virtual_machine</a:t>
             </a:r>
             <a:endParaRPr kumimoji="1" lang="zh-CN" altLang="en-US" dirty="0"/>
@@ -4378,11 +4374,6 @@
         </p:txBody>
       </p:sp>
     </p:spTree>
-    <p:extLst>
-      <p:ext uri="{BB962C8B-B14F-4D97-AF65-F5344CB8AC3E}">
-        <p14:creationId xmlns:p14="http://schemas.microsoft.com/office/powerpoint/2010/main" val="1009468147"/>
-      </p:ext>
-    </p:extLst>
   </p:cSld>
   <p:clrMapOvr>
     <a:masterClrMapping/>
@@ -4458,7 +4449,7 @@
           <p:nvPr/>
         </p:nvPicPr>
         <p:blipFill>
-          <a:blip r:embed="rId2"/>
+          <a:blip r:embed="rId1"/>
           <a:stretch>
             <a:fillRect/>
           </a:stretch>
@@ -4474,11 +4465,6 @@
         </p:spPr>
       </p:pic>
     </p:spTree>
-    <p:extLst>
-      <p:ext uri="{BB962C8B-B14F-4D97-AF65-F5344CB8AC3E}">
-        <p14:creationId xmlns:p14="http://schemas.microsoft.com/office/powerpoint/2010/main" val="2084134943"/>
-      </p:ext>
-    </p:extLst>
   </p:cSld>
   <p:clrMapOvr>
     <a:masterClrMapping/>
@@ -4557,7 +4543,7 @@
           <p:nvPr/>
         </p:nvPicPr>
         <p:blipFill>
-          <a:blip r:embed="rId2"/>
+          <a:blip r:embed="rId1"/>
           <a:stretch>
             <a:fillRect/>
           </a:stretch>
@@ -4573,11 +4559,6 @@
         </p:spPr>
       </p:pic>
     </p:spTree>
-    <p:extLst>
-      <p:ext uri="{BB962C8B-B14F-4D97-AF65-F5344CB8AC3E}">
-        <p14:creationId xmlns:p14="http://schemas.microsoft.com/office/powerpoint/2010/main" val="1083841947"/>
-      </p:ext>
-    </p:extLst>
   </p:cSld>
   <p:clrMapOvr>
     <a:masterClrMapping/>
@@ -4653,7 +4634,7 @@
           <p:nvPr/>
         </p:nvPicPr>
         <p:blipFill>
-          <a:blip r:embed="rId2">
+          <a:blip r:embed="rId1">
             <a:extLst>
               <a:ext uri="{28A0092B-C50C-407E-A947-70E740481C1C}">
                 <a14:useLocalDpi xmlns:a14="http://schemas.microsoft.com/office/drawing/2010/main" val="0"/>
@@ -4686,11 +4667,6 @@
         </p:spPr>
       </p:pic>
     </p:spTree>
-    <p:extLst>
-      <p:ext uri="{BB962C8B-B14F-4D97-AF65-F5344CB8AC3E}">
-        <p14:creationId xmlns:p14="http://schemas.microsoft.com/office/powerpoint/2010/main" val="1463900318"/>
-      </p:ext>
-    </p:extLst>
   </p:cSld>
   <p:clrMapOvr>
     <a:masterClrMapping/>
@@ -4774,7 +4750,7 @@
           <p:nvPr/>
         </p:nvPicPr>
         <p:blipFill>
-          <a:blip r:embed="rId2"/>
+          <a:blip r:embed="rId1"/>
           <a:stretch>
             <a:fillRect/>
           </a:stretch>
@@ -4790,11 +4766,6 @@
         </p:spPr>
       </p:pic>
     </p:spTree>
-    <p:extLst>
-      <p:ext uri="{BB962C8B-B14F-4D97-AF65-F5344CB8AC3E}">
-        <p14:creationId xmlns:p14="http://schemas.microsoft.com/office/powerpoint/2010/main" val="267474777"/>
-      </p:ext>
-    </p:extLst>
   </p:cSld>
   <p:clrMapOvr>
     <a:masterClrMapping/>
@@ -4878,7 +4849,7 @@
           <p:nvPr/>
         </p:nvPicPr>
         <p:blipFill>
-          <a:blip r:embed="rId2">
+          <a:blip r:embed="rId1">
             <a:extLst>
               <a:ext uri="{28A0092B-C50C-407E-A947-70E740481C1C}">
                 <a14:useLocalDpi xmlns:a14="http://schemas.microsoft.com/office/drawing/2010/main" val="0"/>
@@ -4911,11 +4882,6 @@
         </p:spPr>
       </p:pic>
     </p:spTree>
-    <p:extLst>
-      <p:ext uri="{BB962C8B-B14F-4D97-AF65-F5344CB8AC3E}">
-        <p14:creationId xmlns:p14="http://schemas.microsoft.com/office/powerpoint/2010/main" val="778284557"/>
-      </p:ext>
-    </p:extLst>
   </p:cSld>
   <p:clrMapOvr>
     <a:masterClrMapping/>
@@ -4986,6 +4952,7 @@
               <a:rPr kumimoji="1" lang="en-US" altLang="zh-CN" dirty="0" smtClean="0"/>
               <a:t>MINIT</a:t>
             </a:r>
+            <a:endParaRPr kumimoji="1" lang="en-US" altLang="zh-CN" dirty="0" smtClean="0"/>
           </a:p>
           <a:p>
             <a:pPr lvl="1"/>
@@ -5029,6 +4996,7 @@
               <a:rPr lang="en-US" altLang="zh-CN" dirty="0" smtClean="0"/>
               <a:t>entries</a:t>
             </a:r>
+            <a:endParaRPr lang="en-US" altLang="zh-CN" dirty="0" smtClean="0"/>
           </a:p>
           <a:p>
             <a:pPr lvl="1"/>
@@ -5038,11 +5006,54 @@
             </a:r>
             <a:r>
               <a:rPr lang="en-US" altLang="zh-CN" b="1" dirty="0" smtClean="0">
+                <a:hlinkClick r:id="rId1"/>
+              </a:rPr>
+              <a:t>zend_strings</a:t>
+            </a:r>
+            <a:endParaRPr lang="en-US" altLang="zh-CN" b="1" dirty="0" smtClean="0"/>
+          </a:p>
+          <a:p>
+            <a:pPr lvl="1"/>
+            <a:r>
+              <a:rPr lang="en-US" altLang="zh-CN" b="1" u="sng" dirty="0">
                 <a:hlinkClick r:id="rId2"/>
               </a:rPr>
-              <a:t>zend_strings</a:t>
+              <a:t>php_module_startup</a:t>
+            </a:r>
+            <a:r>
+              <a:rPr lang="en-US" altLang="zh-CN" b="1" u="sng" dirty="0" smtClean="0">
+                <a:hlinkClick r:id="rId2"/>
+              </a:rPr>
+              <a:t>()</a:t>
+            </a:r>
+            <a:r>
+              <a:rPr lang="en-US" altLang="zh-CN" b="1" u="sng" dirty="0" smtClean="0"/>
+              <a:t>-&gt;</a:t>
+            </a:r>
+            <a:r>
+              <a:rPr lang="en-US" altLang="zh-CN" dirty="0" err="1" smtClean="0"/>
+              <a:t>zend_startup_modules</a:t>
+            </a:r>
+            <a:r>
+              <a:rPr lang="en-US" altLang="zh-CN" dirty="0" smtClean="0"/>
+              <a:t>-&gt;MINIT()</a:t>
             </a:r>
             <a:endParaRPr lang="en-US" altLang="zh-CN" b="1" dirty="0" smtClean="0"/>
+          </a:p>
+          <a:p>
+            <a:r>
+              <a:rPr kumimoji="1" lang="en-US" altLang="zh-CN" b="1" dirty="0" smtClean="0"/>
+              <a:t>MSHUTDOWN</a:t>
+            </a:r>
+            <a:endParaRPr kumimoji="1" lang="en-US" altLang="zh-CN" b="1" dirty="0" smtClean="0"/>
+          </a:p>
+          <a:p>
+            <a:pPr lvl="1"/>
+            <a:r>
+              <a:rPr lang="en-US" altLang="zh-CN" dirty="0" err="1" smtClean="0"/>
+              <a:t>Pefree</a:t>
+            </a:r>
+            <a:endParaRPr lang="en-US" altLang="zh-CN" dirty="0" smtClean="0"/>
           </a:p>
           <a:p>
             <a:pPr lvl="1"/>
@@ -5050,7 +5061,7 @@
               <a:rPr lang="en-US" altLang="zh-CN" b="1" u="sng" dirty="0">
                 <a:hlinkClick r:id="rId3"/>
               </a:rPr>
-              <a:t>php_module_startup</a:t>
+              <a:t>php_module_shutdown</a:t>
             </a:r>
             <a:r>
               <a:rPr lang="en-US" altLang="zh-CN" b="1" u="sng" dirty="0" smtClean="0">
@@ -5064,48 +5075,6 @@
             </a:r>
             <a:r>
               <a:rPr lang="en-US" altLang="zh-CN" dirty="0" err="1" smtClean="0"/>
-              <a:t>zend_startup_modules</a:t>
-            </a:r>
-            <a:r>
-              <a:rPr lang="en-US" altLang="zh-CN" dirty="0" smtClean="0"/>
-              <a:t>-&gt;MINIT()</a:t>
-            </a:r>
-            <a:endParaRPr lang="en-US" altLang="zh-CN" b="1" dirty="0" smtClean="0"/>
-          </a:p>
-          <a:p>
-            <a:r>
-              <a:rPr kumimoji="1" lang="en-US" altLang="zh-CN" b="1" dirty="0" smtClean="0"/>
-              <a:t>MSHUTDOWN</a:t>
-            </a:r>
-          </a:p>
-          <a:p>
-            <a:pPr lvl="1"/>
-            <a:r>
-              <a:rPr lang="en-US" altLang="zh-CN" dirty="0" err="1" smtClean="0"/>
-              <a:t>Pefree</a:t>
-            </a:r>
-            <a:endParaRPr lang="en-US" altLang="zh-CN" dirty="0" smtClean="0"/>
-          </a:p>
-          <a:p>
-            <a:pPr lvl="1"/>
-            <a:r>
-              <a:rPr lang="en-US" altLang="zh-CN" b="1" u="sng" dirty="0">
-                <a:hlinkClick r:id="rId4"/>
-              </a:rPr>
-              <a:t>php_module_shutdown</a:t>
-            </a:r>
-            <a:r>
-              <a:rPr lang="en-US" altLang="zh-CN" b="1" u="sng" dirty="0" smtClean="0">
-                <a:hlinkClick r:id="rId4"/>
-              </a:rPr>
-              <a:t>()</a:t>
-            </a:r>
-            <a:r>
-              <a:rPr lang="en-US" altLang="zh-CN" b="1" u="sng" dirty="0" smtClean="0"/>
-              <a:t>-&gt;</a:t>
-            </a:r>
-            <a:r>
-              <a:rPr lang="en-US" altLang="zh-CN" dirty="0" err="1" smtClean="0"/>
               <a:t>zend_shutdown</a:t>
             </a:r>
             <a:r>
@@ -5128,11 +5097,6 @@
         </p:txBody>
       </p:sp>
     </p:spTree>
-    <p:extLst>
-      <p:ext uri="{BB962C8B-B14F-4D97-AF65-F5344CB8AC3E}">
-        <p14:creationId xmlns:p14="http://schemas.microsoft.com/office/powerpoint/2010/main" val="1111154344"/>
-      </p:ext>
-    </p:extLst>
   </p:cSld>
   <p:clrMapOvr>
     <a:masterClrMapping/>
@@ -5203,6 +5167,42 @@
               <a:rPr kumimoji="1" lang="en-US" altLang="zh-CN" dirty="0" smtClean="0"/>
               <a:t>RINIT</a:t>
             </a:r>
+            <a:endParaRPr kumimoji="1" lang="en-US" altLang="zh-CN" dirty="0" smtClean="0"/>
+          </a:p>
+          <a:p>
+            <a:pPr lvl="1"/>
+            <a:r>
+              <a:rPr lang="en-US" altLang="zh-CN" b="1" u="sng" dirty="0">
+                <a:hlinkClick r:id="rId1"/>
+              </a:rPr>
+              <a:t>php_request_startup</a:t>
+            </a:r>
+            <a:r>
+              <a:rPr lang="en-US" altLang="zh-CN" b="1" u="sng" dirty="0" smtClean="0">
+                <a:hlinkClick r:id="rId1"/>
+              </a:rPr>
+              <a:t>()</a:t>
+            </a:r>
+            <a:r>
+              <a:rPr lang="en-US" altLang="zh-CN" b="1" u="sng" dirty="0" smtClean="0"/>
+              <a:t>-&gt;</a:t>
+            </a:r>
+            <a:r>
+              <a:rPr lang="en-US" altLang="zh-CN" dirty="0" err="1" smtClean="0"/>
+              <a:t>zend_activate_module</a:t>
+            </a:r>
+            <a:r>
+              <a:rPr lang="en-US" altLang="zh-CN" dirty="0" smtClean="0"/>
+              <a:t>-&gt;RINIT()</a:t>
+            </a:r>
+            <a:endParaRPr lang="en-US" altLang="zh-CN" dirty="0" smtClean="0"/>
+          </a:p>
+          <a:p>
+            <a:r>
+              <a:rPr lang="en-US" altLang="zh-CN" dirty="0"/>
+              <a:t>RSHUTDOWN</a:t>
+            </a:r>
+            <a:endParaRPr lang="en-US" altLang="zh-CN" dirty="0"/>
           </a:p>
           <a:p>
             <a:pPr lvl="1"/>
@@ -5210,7 +5210,7 @@
               <a:rPr lang="en-US" altLang="zh-CN" b="1" u="sng" dirty="0">
                 <a:hlinkClick r:id="rId2"/>
               </a:rPr>
-              <a:t>php_request_startup</a:t>
+              <a:t>php_request_shutdown</a:t>
             </a:r>
             <a:r>
               <a:rPr lang="en-US" altLang="zh-CN" b="1" u="sng" dirty="0" smtClean="0">
@@ -5224,39 +5224,6 @@
             </a:r>
             <a:r>
               <a:rPr lang="en-US" altLang="zh-CN" dirty="0" err="1" smtClean="0"/>
-              <a:t>zend_activate_module</a:t>
-            </a:r>
-            <a:r>
-              <a:rPr lang="en-US" altLang="zh-CN" dirty="0" smtClean="0"/>
-              <a:t>-&gt;RINIT()</a:t>
-            </a:r>
-          </a:p>
-          <a:p>
-            <a:r>
-              <a:rPr lang="en-US" altLang="zh-CN" dirty="0"/>
-              <a:t>RSHUTDOWN</a:t>
-            </a:r>
-          </a:p>
-          <a:p>
-            <a:pPr lvl="1"/>
-            <a:r>
-              <a:rPr lang="en-US" altLang="zh-CN" b="1" u="sng" dirty="0">
-                <a:hlinkClick r:id="rId3"/>
-              </a:rPr>
-              <a:t>php_request_shutdown</a:t>
-            </a:r>
-            <a:r>
-              <a:rPr lang="en-US" altLang="zh-CN" b="1" u="sng" dirty="0" smtClean="0">
-                <a:hlinkClick r:id="rId3"/>
-              </a:rPr>
-              <a:t>()</a:t>
-            </a:r>
-            <a:r>
-              <a:rPr lang="en-US" altLang="zh-CN" b="1" u="sng" dirty="0" smtClean="0"/>
-              <a:t>-&gt;</a:t>
-            </a:r>
-            <a:r>
-              <a:rPr lang="en-US" altLang="zh-CN" dirty="0" err="1" smtClean="0"/>
               <a:t>zend_deactivate_modules</a:t>
             </a:r>
             <a:r>
@@ -5268,11 +5235,6 @@
         </p:txBody>
       </p:sp>
     </p:spTree>
-    <p:extLst>
-      <p:ext uri="{BB962C8B-B14F-4D97-AF65-F5344CB8AC3E}">
-        <p14:creationId xmlns:p14="http://schemas.microsoft.com/office/powerpoint/2010/main" val="811286637"/>
-      </p:ext>
-    </p:extLst>
   </p:cSld>
   <p:clrMapOvr>
     <a:masterClrMapping/>
@@ -5352,7 +5314,7 @@
           <p:nvPr/>
         </p:nvPicPr>
         <p:blipFill>
-          <a:blip r:embed="rId2"/>
+          <a:blip r:embed="rId1"/>
           <a:stretch>
             <a:fillRect/>
           </a:stretch>
@@ -5376,7 +5338,7 @@
           <p:nvPr/>
         </p:nvPicPr>
         <p:blipFill>
-          <a:blip r:embed="rId3"/>
+          <a:blip r:embed="rId2"/>
           <a:stretch>
             <a:fillRect/>
           </a:stretch>
@@ -5392,11 +5354,6 @@
         </p:spPr>
       </p:pic>
     </p:spTree>
-    <p:extLst>
-      <p:ext uri="{BB962C8B-B14F-4D97-AF65-F5344CB8AC3E}">
-        <p14:creationId xmlns:p14="http://schemas.microsoft.com/office/powerpoint/2010/main" val="2115728655"/>
-      </p:ext>
-    </p:extLst>
   </p:cSld>
   <p:clrMapOvr>
     <a:masterClrMapping/>
@@ -5447,7 +5404,7 @@
     </a:clrScheme>
     <a:fontScheme name="Gallery">
       <a:majorFont>
-        <a:latin typeface="Gill Sans MT" panose="020B0502020104020203"/>
+        <a:latin typeface="Gill Sans MT"/>
         <a:ea typeface=""/>
         <a:cs typeface=""/>
         <a:font script="Jpan" typeface="游ゴシック Light"/>
@@ -5482,7 +5439,7 @@
         <a:font script="Geor" typeface="Sylfaen"/>
       </a:majorFont>
       <a:minorFont>
-        <a:latin typeface="Gill Sans MT" panose="020B0502020104020203"/>
+        <a:latin typeface="Gill Sans MT"/>
         <a:ea typeface=""/>
         <a:cs typeface=""/>
         <a:font script="Jpan" typeface="游ゴシック"/>
@@ -5647,11 +5604,9 @@
       </a:bgFillStyleLst>
     </a:fmtScheme>
   </a:themeElements>
-  <a:objectDefaults/>
-  <a:extraClrSchemeLst/>
   <a:extLst>
     <a:ext uri="{05A4C25C-085E-4340-85A3-A5531E510DB2}">
-      <thm15:themeFamily xmlns:thm15="http://schemas.microsoft.com/office/thememl/2012/main" name="Gallery" id="{BBFCD31E-59A1-489D-B089-A3EAD7CAE12E}" vid="{F5E91637-A7B6-4E27-B710-77DA7014EE1E}"/>
+      <thm15:themeFamily xmlns:thm15="http://schemas.microsoft.com/office/thememl/2012/main" name="Office Theme" id="{62F939B6-93AF-4DB8-9C6B-D6C7DFDC589F}" vid="{4A3C46E8-61CC-4603-A589-7422A47A8E4A}"/>
     </a:ext>
   </a:extLst>
 </a:theme>

</xml_diff>